<commit_message>
R is not working
</commit_message>
<xml_diff>
--- a/manuscript/manuscript_figures/experimentalDesign.pptx
+++ b/manuscript/manuscript_figures/experimentalDesign.pptx
@@ -1,6 +1,6 @@
 
 <file path=ppt/presentation.xml><?xml version="1.0" encoding="utf-8"?>
-<p:presentation xmlns:a="http://schemas.openxmlformats.org/drawingml/2006/main" xmlns:r="http://schemas.openxmlformats.org/officeDocument/2006/relationships" xmlns:p="http://schemas.openxmlformats.org/presentationml/2006/main" saveSubsetFonts="1">
+<p:presentation xmlns:a="http://schemas.openxmlformats.org/drawingml/2006/main" xmlns:r="http://schemas.openxmlformats.org/officeDocument/2006/relationships" xmlns:p="http://schemas.openxmlformats.org/presentationml/2006/main" saveSubsetFonts="1" autoCompressPictures="0">
   <p:sldMasterIdLst>
     <p:sldMasterId id="2147483684" r:id="rId1"/>
   </p:sldMasterIdLst>
@@ -104,6 +104,11 @@
       </a:defRPr>
     </a:lvl9pPr>
   </p:defaultTextStyle>
+  <p:extLst>
+    <p:ext uri="{EFAFB233-063F-42B5-8137-9DF3F51BA10A}">
+      <p15:sldGuideLst xmlns:p15="http://schemas.microsoft.com/office/powerpoint/2012/main"/>
+    </p:ext>
+  </p:extLst>
 </p:presentation>
 </file>
 
@@ -283,7 +288,7 @@
           <a:p>
             <a:fld id="{C0C26C28-9BB3-45AD-B6F8-5EF772259F28}" type="datetimeFigureOut">
               <a:rPr lang="en-US" smtClean="0"/>
-              <a:t>12/9/2023</a:t>
+              <a:t>12/16/2023</a:t>
             </a:fld>
             <a:endParaRPr lang="en-US"/>
           </a:p>
@@ -453,7 +458,7 @@
           <a:p>
             <a:fld id="{C0C26C28-9BB3-45AD-B6F8-5EF772259F28}" type="datetimeFigureOut">
               <a:rPr lang="en-US" smtClean="0"/>
-              <a:t>12/9/2023</a:t>
+              <a:t>12/16/2023</a:t>
             </a:fld>
             <a:endParaRPr lang="en-US"/>
           </a:p>
@@ -633,7 +638,7 @@
           <a:p>
             <a:fld id="{C0C26C28-9BB3-45AD-B6F8-5EF772259F28}" type="datetimeFigureOut">
               <a:rPr lang="en-US" smtClean="0"/>
-              <a:t>12/9/2023</a:t>
+              <a:t>12/16/2023</a:t>
             </a:fld>
             <a:endParaRPr lang="en-US"/>
           </a:p>
@@ -803,7 +808,7 @@
           <a:p>
             <a:fld id="{C0C26C28-9BB3-45AD-B6F8-5EF772259F28}" type="datetimeFigureOut">
               <a:rPr lang="en-US" smtClean="0"/>
-              <a:t>12/9/2023</a:t>
+              <a:t>12/16/2023</a:t>
             </a:fld>
             <a:endParaRPr lang="en-US"/>
           </a:p>
@@ -1049,7 +1054,7 @@
           <a:p>
             <a:fld id="{C0C26C28-9BB3-45AD-B6F8-5EF772259F28}" type="datetimeFigureOut">
               <a:rPr lang="en-US" smtClean="0"/>
-              <a:t>12/9/2023</a:t>
+              <a:t>12/16/2023</a:t>
             </a:fld>
             <a:endParaRPr lang="en-US"/>
           </a:p>
@@ -1281,7 +1286,7 @@
           <a:p>
             <a:fld id="{C0C26C28-9BB3-45AD-B6F8-5EF772259F28}" type="datetimeFigureOut">
               <a:rPr lang="en-US" smtClean="0"/>
-              <a:t>12/9/2023</a:t>
+              <a:t>12/16/2023</a:t>
             </a:fld>
             <a:endParaRPr lang="en-US"/>
           </a:p>
@@ -1648,7 +1653,7 @@
           <a:p>
             <a:fld id="{C0C26C28-9BB3-45AD-B6F8-5EF772259F28}" type="datetimeFigureOut">
               <a:rPr lang="en-US" smtClean="0"/>
-              <a:t>12/9/2023</a:t>
+              <a:t>12/16/2023</a:t>
             </a:fld>
             <a:endParaRPr lang="en-US"/>
           </a:p>
@@ -1766,7 +1771,7 @@
           <a:p>
             <a:fld id="{C0C26C28-9BB3-45AD-B6F8-5EF772259F28}" type="datetimeFigureOut">
               <a:rPr lang="en-US" smtClean="0"/>
-              <a:t>12/9/2023</a:t>
+              <a:t>12/16/2023</a:t>
             </a:fld>
             <a:endParaRPr lang="en-US"/>
           </a:p>
@@ -1861,7 +1866,7 @@
           <a:p>
             <a:fld id="{C0C26C28-9BB3-45AD-B6F8-5EF772259F28}" type="datetimeFigureOut">
               <a:rPr lang="en-US" smtClean="0"/>
-              <a:t>12/9/2023</a:t>
+              <a:t>12/16/2023</a:t>
             </a:fld>
             <a:endParaRPr lang="en-US"/>
           </a:p>
@@ -2138,7 +2143,7 @@
           <a:p>
             <a:fld id="{C0C26C28-9BB3-45AD-B6F8-5EF772259F28}" type="datetimeFigureOut">
               <a:rPr lang="en-US" smtClean="0"/>
-              <a:t>12/9/2023</a:t>
+              <a:t>12/16/2023</a:t>
             </a:fld>
             <a:endParaRPr lang="en-US"/>
           </a:p>
@@ -2395,7 +2400,7 @@
           <a:p>
             <a:fld id="{C0C26C28-9BB3-45AD-B6F8-5EF772259F28}" type="datetimeFigureOut">
               <a:rPr lang="en-US" smtClean="0"/>
-              <a:t>12/9/2023</a:t>
+              <a:t>12/16/2023</a:t>
             </a:fld>
             <a:endParaRPr lang="en-US"/>
           </a:p>
@@ -2608,7 +2613,7 @@
           <a:p>
             <a:fld id="{C0C26C28-9BB3-45AD-B6F8-5EF772259F28}" type="datetimeFigureOut">
               <a:rPr lang="en-US" smtClean="0"/>
-              <a:t>12/9/2023</a:t>
+              <a:t>12/16/2023</a:t>
             </a:fld>
             <a:endParaRPr lang="en-US"/>
           </a:p>

</xml_diff>